<commit_message>
Finalized report and added frequency domain band pass filtered plot
</commit_message>
<xml_diff>
--- a/reports/final_presentation.pptx
+++ b/reports/final_presentation.pptx
@@ -4977,10 +4977,10 @@
       </p:sp>
       <p:pic>
         <p:nvPicPr>
-          <p:cNvPr id="3" name="Picture 2" descr="A graph showing a signal&#10;&#10;AI-generated content may be incorrect.">
-            <a:extLst>
-              <a:ext uri="{FF2B5EF4-FFF2-40B4-BE49-F238E27FC236}">
-                <a16:creationId xmlns:a16="http://schemas.microsoft.com/office/drawing/2014/main" id="{CAF5F415-5EC3-AD79-21C9-10C7DA73E588}"/>
+          <p:cNvPr id="5" name="Picture 4" descr="A diagram of a signal&#10;&#10;AI-generated content may be incorrect.">
+            <a:extLst>
+              <a:ext uri="{FF2B5EF4-FFF2-40B4-BE49-F238E27FC236}">
+                <a16:creationId xmlns:a16="http://schemas.microsoft.com/office/drawing/2014/main" id="{FA849FA0-08A9-463B-1180-F49D92B4BAAC}"/>
               </a:ext>
             </a:extLst>
           </p:cNvPr>
@@ -4990,21 +4990,15 @@
           <p:nvPr/>
         </p:nvPicPr>
         <p:blipFill>
-          <a:blip r:embed="rId2">
-            <a:extLst>
-              <a:ext uri="{28A0092B-C50C-407E-A947-70E740481C1C}">
-                <a14:useLocalDpi xmlns:a14="http://schemas.microsoft.com/office/drawing/2010/main" val="0"/>
-              </a:ext>
-            </a:extLst>
-          </a:blip>
+          <a:blip r:embed="rId2"/>
           <a:stretch>
             <a:fillRect/>
           </a:stretch>
         </p:blipFill>
         <p:spPr>
           <a:xfrm>
-            <a:off x="2263302" y="1522702"/>
-            <a:ext cx="7665395" cy="4599237"/>
+            <a:off x="1455358" y="1530083"/>
+            <a:ext cx="9281282" cy="4640641"/>
           </a:xfrm>
           <a:prstGeom prst="rect">
             <a:avLst/>

</xml_diff>

<commit_message>
Freqeuncy domain plot for low-pass denoiser
</commit_message>
<xml_diff>
--- a/reports/final_presentation.pptx
+++ b/reports/final_presentation.pptx
@@ -14121,10 +14121,10 @@
       </p:sp>
       <p:pic>
         <p:nvPicPr>
-          <p:cNvPr id="2" name="Picture 1" descr="A graph showing a signal&#10;&#10;AI-generated content may be incorrect.">
-            <a:extLst>
-              <a:ext uri="{FF2B5EF4-FFF2-40B4-BE49-F238E27FC236}">
-                <a16:creationId xmlns:a16="http://schemas.microsoft.com/office/drawing/2014/main" id="{B7F6266E-37F3-4F6E-A1B5-64A5FF862ADC}"/>
+          <p:cNvPr id="3" name="Picture 2" descr="A diagram of a signal&#10;&#10;AI-generated content may be incorrect.">
+            <a:extLst>
+              <a:ext uri="{FF2B5EF4-FFF2-40B4-BE49-F238E27FC236}">
+                <a16:creationId xmlns:a16="http://schemas.microsoft.com/office/drawing/2014/main" id="{C8449C3B-C1F6-817C-6D73-DA7FE3B92AD3}"/>
               </a:ext>
             </a:extLst>
           </p:cNvPr>
@@ -14147,8 +14147,8 @@
         </p:blipFill>
         <p:spPr>
           <a:xfrm>
-            <a:off x="2397692" y="1690688"/>
-            <a:ext cx="7396615" cy="4437969"/>
+            <a:off x="1266445" y="1614483"/>
+            <a:ext cx="9659110" cy="4829555"/>
           </a:xfrm>
           <a:prstGeom prst="rect">
             <a:avLst/>

</xml_diff>